<commit_message>
re-created project report and changes in code
</commit_message>
<xml_diff>
--- a/Fee presentation.pptx
+++ b/Fee presentation.pptx
@@ -13,9 +13,8 @@
     <p:sldId id="274" r:id="rId7"/>
     <p:sldId id="275" r:id="rId8"/>
     <p:sldId id="278" r:id="rId9"/>
-    <p:sldId id="280" r:id="rId10"/>
-    <p:sldId id="279" r:id="rId11"/>
-    <p:sldId id="265" r:id="rId12"/>
+    <p:sldId id="279" r:id="rId10"/>
+    <p:sldId id="265" r:id="rId11"/>
   </p:sldIdLst>
   <p:sldSz cx="9144000" cy="6858000" type="screen4x3"/>
   <p:notesSz cx="6858000" cy="9144000"/>
@@ -133,16 +132,70 @@
 </p:presentation>
 </file>
 
-<file path=ppt/revisionInfo.xml><?xml version="1.0" encoding="utf-8"?>
-<p1510:revInfo xmlns:a="http://schemas.openxmlformats.org/drawingml/2006/main" xmlns:r="http://schemas.openxmlformats.org/officeDocument/2006/relationships" xmlns:p1510="http://schemas.microsoft.com/office/powerpoint/2015/10/main">
-  <p1510:revLst>
-    <p1510:client id="{E4520C43-E7D6-4FC7-A0E9-1D65DA7A86D1}" v="45" dt="2023-05-03T19:51:52.663"/>
-  </p1510:revLst>
-</p1510:revInfo>
-</file>
-
 <file path=ppt/changesInfos/changesInfo1.xml><?xml version="1.0" encoding="utf-8"?>
 <pc:chgInfo xmlns:a="http://schemas.openxmlformats.org/drawingml/2006/main" xmlns:r="http://schemas.openxmlformats.org/officeDocument/2006/relationships" xmlns:ac="http://schemas.microsoft.com/office/drawing/2013/main/command" xmlns:pc="http://schemas.microsoft.com/office/powerpoint/2013/main/command">
+  <pc:docChgLst>
+    <pc:chgData name="Shunsuke ‎‎‎‎‎" userId="b513fa1e-2d0e-4785-9341-908e242f47b9" providerId="ADAL" clId="{D5AA6005-F808-4DD6-9AFA-C5AAC3B3D0CE}"/>
+    <pc:docChg chg="custSel delSld modSld">
+      <pc:chgData name="Shunsuke ‎‎‎‎‎" userId="b513fa1e-2d0e-4785-9341-908e242f47b9" providerId="ADAL" clId="{D5AA6005-F808-4DD6-9AFA-C5AAC3B3D0CE}" dt="2023-05-22T18:24:26.739" v="66" actId="20577"/>
+      <pc:docMkLst>
+        <pc:docMk/>
+      </pc:docMkLst>
+      <pc:sldChg chg="delSp modSp mod">
+        <pc:chgData name="Shunsuke ‎‎‎‎‎" userId="b513fa1e-2d0e-4785-9341-908e242f47b9" providerId="ADAL" clId="{D5AA6005-F808-4DD6-9AFA-C5AAC3B3D0CE}" dt="2023-05-22T18:24:04.706" v="42" actId="478"/>
+        <pc:sldMkLst>
+          <pc:docMk/>
+          <pc:sldMk cId="0" sldId="272"/>
+        </pc:sldMkLst>
+        <pc:spChg chg="mod">
+          <ac:chgData name="Shunsuke ‎‎‎‎‎" userId="b513fa1e-2d0e-4785-9341-908e242f47b9" providerId="ADAL" clId="{D5AA6005-F808-4DD6-9AFA-C5AAC3B3D0CE}" dt="2023-05-22T18:23:56.407" v="40" actId="20577"/>
+          <ac:spMkLst>
+            <pc:docMk/>
+            <pc:sldMk cId="0" sldId="272"/>
+            <ac:spMk id="3" creationId="{00000000-0000-0000-0000-000000000000}"/>
+          </ac:spMkLst>
+        </pc:spChg>
+        <pc:spChg chg="del">
+          <ac:chgData name="Shunsuke ‎‎‎‎‎" userId="b513fa1e-2d0e-4785-9341-908e242f47b9" providerId="ADAL" clId="{D5AA6005-F808-4DD6-9AFA-C5AAC3B3D0CE}" dt="2023-05-22T18:24:02.101" v="41" actId="478"/>
+          <ac:spMkLst>
+            <pc:docMk/>
+            <pc:sldMk cId="0" sldId="272"/>
+            <ac:spMk id="7" creationId="{C8E2A3F3-754F-4CFB-AC84-70AB25D0FDEF}"/>
+          </ac:spMkLst>
+        </pc:spChg>
+        <pc:spChg chg="del">
+          <ac:chgData name="Shunsuke ‎‎‎‎‎" userId="b513fa1e-2d0e-4785-9341-908e242f47b9" providerId="ADAL" clId="{D5AA6005-F808-4DD6-9AFA-C5AAC3B3D0CE}" dt="2023-05-22T18:24:04.706" v="42" actId="478"/>
+          <ac:spMkLst>
+            <pc:docMk/>
+            <pc:sldMk cId="0" sldId="272"/>
+            <ac:spMk id="8" creationId="{E00116D1-C860-4D51-8137-09F94BF3CA1C}"/>
+          </ac:spMkLst>
+        </pc:spChg>
+      </pc:sldChg>
+      <pc:sldChg chg="modSp mod">
+        <pc:chgData name="Shunsuke ‎‎‎‎‎" userId="b513fa1e-2d0e-4785-9341-908e242f47b9" providerId="ADAL" clId="{D5AA6005-F808-4DD6-9AFA-C5AAC3B3D0CE}" dt="2023-05-22T18:24:26.739" v="66" actId="20577"/>
+        <pc:sldMkLst>
+          <pc:docMk/>
+          <pc:sldMk cId="0" sldId="275"/>
+        </pc:sldMkLst>
+        <pc:spChg chg="mod">
+          <ac:chgData name="Shunsuke ‎‎‎‎‎" userId="b513fa1e-2d0e-4785-9341-908e242f47b9" providerId="ADAL" clId="{D5AA6005-F808-4DD6-9AFA-C5AAC3B3D0CE}" dt="2023-05-22T18:24:26.739" v="66" actId="20577"/>
+          <ac:spMkLst>
+            <pc:docMk/>
+            <pc:sldMk cId="0" sldId="275"/>
+            <ac:spMk id="7" creationId="{8B57E435-A87B-422E-9A18-E151E0D54DA1}"/>
+          </ac:spMkLst>
+        </pc:spChg>
+      </pc:sldChg>
+      <pc:sldChg chg="del">
+        <pc:chgData name="Shunsuke ‎‎‎‎‎" userId="b513fa1e-2d0e-4785-9341-908e242f47b9" providerId="ADAL" clId="{D5AA6005-F808-4DD6-9AFA-C5AAC3B3D0CE}" dt="2023-05-22T18:22:09.323" v="0" actId="2696"/>
+        <pc:sldMkLst>
+          <pc:docMk/>
+          <pc:sldMk cId="3569010666" sldId="280"/>
+        </pc:sldMkLst>
+      </pc:sldChg>
+    </pc:docChg>
+  </pc:docChgLst>
   <pc:docChgLst>
     <pc:chgData name="Shunsuke ‎‎‎‎‎" userId="b513fa1e-2d0e-4785-9341-908e242f47b9" providerId="ADAL" clId="{E4520C43-E7D6-4FC7-A0E9-1D65DA7A86D1}"/>
     <pc:docChg chg="undo custSel modSld">
@@ -410,7 +463,7 @@
             <a:fld id="{1D5BB0C6-8FC1-47C0-B737-D54E21B5B868}" type="datetimeFigureOut">
               <a:rPr lang="en-US" smtClean="0"/>
               <a:pPr/>
-              <a:t>5/4/2023</a:t>
+              <a:t>5/22/2023</a:t>
             </a:fld>
             <a:endParaRPr lang="en-US"/>
           </a:p>
@@ -827,7 +880,7 @@
             <a:fld id="{1D5BB0C6-8FC1-47C0-B737-D54E21B5B868}" type="datetimeFigureOut">
               <a:rPr lang="en-US" smtClean="0"/>
               <a:pPr/>
-              <a:t>5/4/2023</a:t>
+              <a:t>5/22/2023</a:t>
             </a:fld>
             <a:endParaRPr lang="en-US"/>
           </a:p>
@@ -930,7 +983,7 @@
             <a:fld id="{1D5BB0C6-8FC1-47C0-B737-D54E21B5B868}" type="datetimeFigureOut">
               <a:rPr lang="en-US" smtClean="0"/>
               <a:pPr/>
-              <a:t>5/4/2023</a:t>
+              <a:t>5/22/2023</a:t>
             </a:fld>
             <a:endParaRPr lang="en-US"/>
           </a:p>
@@ -1167,7 +1220,7 @@
             <a:fld id="{1D5BB0C6-8FC1-47C0-B737-D54E21B5B868}" type="datetimeFigureOut">
               <a:rPr lang="en-US" smtClean="0"/>
               <a:pPr/>
-              <a:t>5/4/2023</a:t>
+              <a:t>5/22/2023</a:t>
             </a:fld>
             <a:endParaRPr lang="en-US"/>
           </a:p>
@@ -2266,253 +2319,6 @@
       </p:grpSpPr>
       <p:sp>
         <p:nvSpPr>
-          <p:cNvPr id="2" name="TextBox 1"/>
-          <p:cNvSpPr txBox="1"/>
-          <p:nvPr/>
-        </p:nvSpPr>
-        <p:spPr>
-          <a:xfrm>
-            <a:off x="399108" y="116632"/>
-            <a:ext cx="5400600" cy="584775"/>
-          </a:xfrm>
-          <a:prstGeom prst="rect">
-            <a:avLst/>
-          </a:prstGeom>
-          <a:noFill/>
-        </p:spPr>
-        <p:txBody>
-          <a:bodyPr wrap="square" rtlCol="0">
-            <a:spAutoFit/>
-          </a:bodyPr>
-          <a:lstStyle/>
-          <a:p>
-            <a:r>
-              <a:rPr lang="en-US" sz="3200" dirty="0">
-                <a:latin typeface="Times New Roman" pitchFamily="18" charset="0"/>
-                <a:cs typeface="Times New Roman" pitchFamily="18" charset="0"/>
-              </a:rPr>
-              <a:t>References/Links used</a:t>
-            </a:r>
-          </a:p>
-        </p:txBody>
-      </p:sp>
-      <p:sp>
-        <p:nvSpPr>
-          <p:cNvPr id="4" name="TextBox 3">
-            <a:extLst>
-              <a:ext uri="{FF2B5EF4-FFF2-40B4-BE49-F238E27FC236}">
-                <a16:creationId xmlns:a16="http://schemas.microsoft.com/office/drawing/2014/main" id="{0A61EA2A-9C16-4F6F-8B7B-17B585ABF9F2}"/>
-              </a:ext>
-            </a:extLst>
-          </p:cNvPr>
-          <p:cNvSpPr txBox="1"/>
-          <p:nvPr/>
-        </p:nvSpPr>
-        <p:spPr>
-          <a:xfrm>
-            <a:off x="4211960" y="6420417"/>
-            <a:ext cx="1152128" cy="261610"/>
-          </a:xfrm>
-          <a:prstGeom prst="rect">
-            <a:avLst/>
-          </a:prstGeom>
-          <a:noFill/>
-        </p:spPr>
-        <p:txBody>
-          <a:bodyPr wrap="square" rtlCol="0">
-            <a:spAutoFit/>
-          </a:bodyPr>
-          <a:lstStyle/>
-          <a:p>
-            <a:r>
-              <a:rPr lang="en-US" sz="1100" dirty="0">
-                <a:latin typeface="Times New Roman" panose="02020603050405020304" pitchFamily="18" charset="0"/>
-                <a:cs typeface="Times New Roman" panose="02020603050405020304" pitchFamily="18" charset="0"/>
-              </a:rPr>
-              <a:t>(7)</a:t>
-            </a:r>
-            <a:endParaRPr lang="en-IN" sz="1100" dirty="0">
-              <a:latin typeface="Times New Roman" panose="02020603050405020304" pitchFamily="18" charset="0"/>
-              <a:cs typeface="Times New Roman" panose="02020603050405020304" pitchFamily="18" charset="0"/>
-            </a:endParaRPr>
-          </a:p>
-        </p:txBody>
-      </p:sp>
-      <p:sp>
-        <p:nvSpPr>
-          <p:cNvPr id="5" name="TextBox 4">
-            <a:extLst>
-              <a:ext uri="{FF2B5EF4-FFF2-40B4-BE49-F238E27FC236}">
-                <a16:creationId xmlns:a16="http://schemas.microsoft.com/office/drawing/2014/main" id="{9CB7CBEC-BF4D-4E21-8982-C2E25AEE9BA8}"/>
-              </a:ext>
-            </a:extLst>
-          </p:cNvPr>
-          <p:cNvSpPr txBox="1"/>
-          <p:nvPr/>
-        </p:nvSpPr>
-        <p:spPr>
-          <a:xfrm>
-            <a:off x="397372" y="2086353"/>
-            <a:ext cx="7845300" cy="4247317"/>
-          </a:xfrm>
-          <a:prstGeom prst="rect">
-            <a:avLst/>
-          </a:prstGeom>
-          <a:noFill/>
-        </p:spPr>
-        <p:txBody>
-          <a:bodyPr wrap="square" rtlCol="0">
-            <a:spAutoFit/>
-          </a:bodyPr>
-          <a:lstStyle/>
-          <a:p>
-            <a:pPr marL="342900" indent="-342900">
-              <a:buFont typeface="Arial" panose="020B0604020202020204" pitchFamily="34" charset="0"/>
-              <a:buChar char="•"/>
-            </a:pPr>
-            <a:r>
-              <a:rPr lang="en-IN" dirty="0">
-                <a:hlinkClick r:id="rId2"/>
-              </a:rPr>
-              <a:t>https://en.wikipedia.org/wiki/List_of_awards_and_honours_received_by_A._P._J._Abdul_Kalam</a:t>
-            </a:r>
-            <a:endParaRPr lang="en-IN" dirty="0"/>
-          </a:p>
-          <a:p>
-            <a:pPr marL="342900" indent="-342900">
-              <a:buFont typeface="Arial" panose="020B0604020202020204" pitchFamily="34" charset="0"/>
-              <a:buChar char="•"/>
-            </a:pPr>
-            <a:endParaRPr lang="en-IN" dirty="0"/>
-          </a:p>
-          <a:p>
-            <a:pPr marL="342900" indent="-342900">
-              <a:buFont typeface="Arial" panose="020B0604020202020204" pitchFamily="34" charset="0"/>
-              <a:buChar char="•"/>
-            </a:pPr>
-            <a:r>
-              <a:rPr lang="en-IN" dirty="0">
-                <a:hlinkClick r:id="rId3"/>
-              </a:rPr>
-              <a:t>https://en.wikipedia.org/wiki/A._P._J._Abdul_Kalam</a:t>
-            </a:r>
-            <a:endParaRPr lang="en-IN" dirty="0"/>
-          </a:p>
-          <a:p>
-            <a:pPr marL="342900" indent="-342900">
-              <a:buFont typeface="Arial" panose="020B0604020202020204" pitchFamily="34" charset="0"/>
-              <a:buChar char="•"/>
-            </a:pPr>
-            <a:endParaRPr lang="en-IN" dirty="0"/>
-          </a:p>
-          <a:p>
-            <a:pPr marL="342900" indent="-342900">
-              <a:buFont typeface="Arial" panose="020B0604020202020204" pitchFamily="34" charset="0"/>
-              <a:buChar char="•"/>
-            </a:pPr>
-            <a:r>
-              <a:rPr lang="en-IN" dirty="0">
-                <a:hlinkClick r:id="rId4"/>
-              </a:rPr>
-              <a:t>https://learn.culturalindia.net/a-p-j-abdul-kalam.html</a:t>
-            </a:r>
-            <a:endParaRPr lang="en-IN" dirty="0"/>
-          </a:p>
-          <a:p>
-            <a:pPr marL="342900" indent="-342900">
-              <a:buFont typeface="Arial" panose="020B0604020202020204" pitchFamily="34" charset="0"/>
-              <a:buChar char="•"/>
-            </a:pPr>
-            <a:endParaRPr lang="en-IN" dirty="0"/>
-          </a:p>
-          <a:p>
-            <a:pPr marL="342900" indent="-342900">
-              <a:buFont typeface="Arial" panose="020B0604020202020204" pitchFamily="34" charset="0"/>
-              <a:buChar char="•"/>
-            </a:pPr>
-            <a:r>
-              <a:rPr lang="en-IN" dirty="0">
-                <a:hlinkClick r:id="rId5"/>
-              </a:rPr>
-              <a:t>https://www.britannica.com/biography/A-P-J-Abdul-Kalam</a:t>
-            </a:r>
-            <a:endParaRPr lang="en-IN" dirty="0"/>
-          </a:p>
-          <a:p>
-            <a:pPr marL="342900" indent="-342900">
-              <a:buFont typeface="Arial" panose="020B0604020202020204" pitchFamily="34" charset="0"/>
-              <a:buChar char="•"/>
-            </a:pPr>
-            <a:endParaRPr lang="en-IN" dirty="0"/>
-          </a:p>
-          <a:p>
-            <a:pPr marL="342900" indent="-342900">
-              <a:buFont typeface="Arial" panose="020B0604020202020204" pitchFamily="34" charset="0"/>
-              <a:buChar char="•"/>
-            </a:pPr>
-            <a:r>
-              <a:rPr lang="en-IN" dirty="0">
-                <a:hlinkClick r:id="rId6"/>
-              </a:rPr>
-              <a:t>https://www.thefamouspeople.com/profiles/a-p-j-abdul-kalam-590.php</a:t>
-            </a:r>
-            <a:endParaRPr lang="en-IN" dirty="0"/>
-          </a:p>
-          <a:p>
-            <a:endParaRPr lang="en-IN" dirty="0"/>
-          </a:p>
-          <a:p>
-            <a:endParaRPr lang="en-IN" dirty="0"/>
-          </a:p>
-          <a:p>
-            <a:endParaRPr lang="en-IN" dirty="0"/>
-          </a:p>
-          <a:p>
-            <a:pPr marL="342900" indent="-342900">
-              <a:buFont typeface="Arial" panose="020B0604020202020204" pitchFamily="34" charset="0"/>
-              <a:buChar char="•"/>
-            </a:pPr>
-            <a:endParaRPr lang="en-IN" dirty="0"/>
-          </a:p>
-          <a:p>
-            <a:pPr marL="342900" indent="-342900">
-              <a:buFont typeface="Arial" panose="020B0604020202020204" pitchFamily="34" charset="0"/>
-              <a:buChar char="•"/>
-            </a:pPr>
-            <a:endParaRPr lang="en-IN" dirty="0"/>
-          </a:p>
-        </p:txBody>
-      </p:sp>
-    </p:spTree>
-  </p:cSld>
-  <p:clrMapOvr>
-    <a:masterClrMapping/>
-  </p:clrMapOvr>
-  <p:transition advTm="4000">
-    <p:cut/>
-  </p:transition>
-</p:sld>
-</file>
-
-<file path=ppt/slides/slide11.xml><?xml version="1.0" encoding="utf-8"?>
-<p:sld xmlns:a="http://schemas.openxmlformats.org/drawingml/2006/main" xmlns:r="http://schemas.openxmlformats.org/officeDocument/2006/relationships" xmlns:p="http://schemas.openxmlformats.org/presentationml/2006/main">
-  <p:cSld>
-    <p:spTree>
-      <p:nvGrpSpPr>
-        <p:cNvPr id="1" name=""/>
-        <p:cNvGrpSpPr/>
-        <p:nvPr/>
-      </p:nvGrpSpPr>
-      <p:grpSpPr>
-        <a:xfrm>
-          <a:off x="0" y="0"/>
-          <a:ext cx="0" cy="0"/>
-          <a:chOff x="0" y="0"/>
-          <a:chExt cx="0" cy="0"/>
-        </a:xfrm>
-      </p:grpSpPr>
-      <p:sp>
-        <p:nvSpPr>
           <p:cNvPr id="1028" name="AutoShape 4" descr="Download The Best Thank You Slide For PPT Presentation"/>
           <p:cNvSpPr>
             <a:spLocks noChangeAspect="1" noChangeArrowheads="1"/>
@@ -3318,8 +3124,8 @@
         </p:nvSpPr>
         <p:spPr>
           <a:xfrm>
-            <a:off x="467544" y="1340768"/>
-            <a:ext cx="8136904" cy="5909310"/>
+            <a:off x="323528" y="764704"/>
+            <a:ext cx="8136904" cy="7294305"/>
           </a:xfrm>
           <a:prstGeom prst="rect">
             <a:avLst/>
@@ -3437,7 +3243,21 @@
                 <a:latin typeface="Times New Roman" pitchFamily="18" charset="0"/>
                 <a:cs typeface="Times New Roman" pitchFamily="18" charset="0"/>
               </a:rPr>
-              <a:t>Built using HTML and CSS HTML (Hyper Text Markup Language) is used to create the structure and content of web page. CSS (Cascading Style Sheets) is a style sheet language used to describe the presentation and layout of web pages.</a:t>
+              <a:t>Built using HTML, CSS </a:t>
+            </a:r>
+            <a:r>
+              <a:rPr lang="en-US" dirty="0" err="1">
+                <a:latin typeface="Times New Roman" pitchFamily="18" charset="0"/>
+                <a:cs typeface="Times New Roman" pitchFamily="18" charset="0"/>
+              </a:rPr>
+              <a:t>amd</a:t>
+            </a:r>
+            <a:r>
+              <a:rPr lang="en-US" dirty="0">
+                <a:latin typeface="Times New Roman" pitchFamily="18" charset="0"/>
+                <a:cs typeface="Times New Roman" pitchFamily="18" charset="0"/>
+              </a:rPr>
+              <a:t> Java-script. Html (Hyper Text Markup Language) is used to create the structure and content of web page. CSS (Cascading Style Sheets) is a style sheet language used to describe the presentation and layout of web pages.</a:t>
             </a:r>
           </a:p>
           <a:p>
@@ -3487,6 +3307,19 @@
             </a:r>
           </a:p>
           <a:p>
+            <a:pPr marL="1200150" lvl="2" indent="-285750">
+              <a:buFont typeface="Arial" panose="020B0604020202020204" pitchFamily="34" charset="0"/>
+              <a:buChar char="•"/>
+            </a:pPr>
+            <a:r>
+              <a:rPr lang="en-US" dirty="0">
+                <a:latin typeface="Times New Roman" pitchFamily="18" charset="0"/>
+                <a:cs typeface="Times New Roman" pitchFamily="18" charset="0"/>
+              </a:rPr>
+              <a:t>•	JavaScript is a light-weight object-oriented programming language that is used by several websites for scripting the webpages. It is an interpreted, full-fledged programming language. JavaScript enables dynamic interactivity on websites when it is applied to an HTML</a:t>
+            </a:r>
+          </a:p>
+          <a:p>
             <a:r>
               <a:rPr lang="en-US" dirty="0">
                 <a:latin typeface="Times New Roman" pitchFamily="18" charset="0"/>
@@ -3515,98 +3348,6 @@
               </a:rPr>
               <a:t>	</a:t>
             </a:r>
-          </a:p>
-        </p:txBody>
-      </p:sp>
-      <p:sp>
-        <p:nvSpPr>
-          <p:cNvPr id="7" name="Arrow: Right 6">
-            <a:extLst>
-              <a:ext uri="{FF2B5EF4-FFF2-40B4-BE49-F238E27FC236}">
-                <a16:creationId xmlns:a16="http://schemas.microsoft.com/office/drawing/2014/main" id="{C8E2A3F3-754F-4CFB-AC84-70AB25D0FDEF}"/>
-              </a:ext>
-            </a:extLst>
-          </p:cNvPr>
-          <p:cNvSpPr/>
-          <p:nvPr/>
-        </p:nvSpPr>
-        <p:spPr>
-          <a:xfrm>
-            <a:off x="4841292" y="2060848"/>
-            <a:ext cx="216024" cy="72008"/>
-          </a:xfrm>
-          <a:prstGeom prst="rightArrow">
-            <a:avLst/>
-          </a:prstGeom>
-        </p:spPr>
-        <p:style>
-          <a:lnRef idx="2">
-            <a:schemeClr val="accent1">
-              <a:shade val="50000"/>
-            </a:schemeClr>
-          </a:lnRef>
-          <a:fillRef idx="1">
-            <a:schemeClr val="accent1"/>
-          </a:fillRef>
-          <a:effectRef idx="0">
-            <a:schemeClr val="accent1"/>
-          </a:effectRef>
-          <a:fontRef idx="minor">
-            <a:schemeClr val="lt1"/>
-          </a:fontRef>
-        </p:style>
-        <p:txBody>
-          <a:bodyPr rtlCol="0" anchor="ctr"/>
-          <a:lstStyle/>
-          <a:p>
-            <a:pPr algn="ctr"/>
-            <a:endParaRPr lang="en-IN"/>
-          </a:p>
-        </p:txBody>
-      </p:sp>
-      <p:sp>
-        <p:nvSpPr>
-          <p:cNvPr id="8" name="Arrow: Right 7">
-            <a:extLst>
-              <a:ext uri="{FF2B5EF4-FFF2-40B4-BE49-F238E27FC236}">
-                <a16:creationId xmlns:a16="http://schemas.microsoft.com/office/drawing/2014/main" id="{E00116D1-C860-4D51-8137-09F94BF3CA1C}"/>
-              </a:ext>
-            </a:extLst>
-          </p:cNvPr>
-          <p:cNvSpPr/>
-          <p:nvPr/>
-        </p:nvSpPr>
-        <p:spPr>
-          <a:xfrm>
-            <a:off x="2051720" y="3435536"/>
-            <a:ext cx="216024" cy="72008"/>
-          </a:xfrm>
-          <a:prstGeom prst="rightArrow">
-            <a:avLst/>
-          </a:prstGeom>
-        </p:spPr>
-        <p:style>
-          <a:lnRef idx="2">
-            <a:schemeClr val="accent1">
-              <a:shade val="50000"/>
-            </a:schemeClr>
-          </a:lnRef>
-          <a:fillRef idx="1">
-            <a:schemeClr val="accent1"/>
-          </a:fillRef>
-          <a:effectRef idx="0">
-            <a:schemeClr val="accent1"/>
-          </a:effectRef>
-          <a:fontRef idx="minor">
-            <a:schemeClr val="lt1"/>
-          </a:fontRef>
-        </p:style>
-        <p:txBody>
-          <a:bodyPr rtlCol="0" anchor="ctr"/>
-          <a:lstStyle/>
-          <a:p>
-            <a:pPr algn="ctr"/>
-            <a:endParaRPr lang="en-IN"/>
           </a:p>
         </p:txBody>
       </p:sp>
@@ -4042,7 +3783,21 @@
                 <a:latin typeface="Times New Roman" panose="02020603050405020304" pitchFamily="18" charset="0"/>
                 <a:cs typeface="Times New Roman" panose="02020603050405020304" pitchFamily="18" charset="0"/>
               </a:rPr>
-              <a:t>Code quality: The project demonstrates good coding practices, such as clean and organized code structure, proper use of HTML and CSS , and adherence to web development best practices.</a:t>
+              <a:t>Code quality: The project demonstrates good coding practices, such as clean and organized code structure, proper use of HTML, CSS , </a:t>
+            </a:r>
+            <a:r>
+              <a:rPr lang="en-US" dirty="0" err="1">
+                <a:latin typeface="Times New Roman" panose="02020603050405020304" pitchFamily="18" charset="0"/>
+                <a:cs typeface="Times New Roman" panose="02020603050405020304" pitchFamily="18" charset="0"/>
+              </a:rPr>
+              <a:t>japascript</a:t>
+            </a:r>
+            <a:r>
+              <a:rPr lang="en-US" dirty="0">
+                <a:latin typeface="Times New Roman" panose="02020603050405020304" pitchFamily="18" charset="0"/>
+                <a:cs typeface="Times New Roman" panose="02020603050405020304" pitchFamily="18" charset="0"/>
+              </a:rPr>
+              <a:t> and adherence to web development best practices.</a:t>
             </a:r>
           </a:p>
           <a:p>
@@ -4351,7 +4106,7 @@
         </p:nvSpPr>
         <p:spPr>
           <a:xfrm>
-            <a:off x="467544" y="260648"/>
+            <a:off x="399108" y="116632"/>
             <a:ext cx="5400600" cy="584775"/>
           </a:xfrm>
           <a:prstGeom prst="rect">
@@ -4370,68 +4125,7 @@
                 <a:latin typeface="Times New Roman" pitchFamily="18" charset="0"/>
                 <a:cs typeface="Times New Roman" pitchFamily="18" charset="0"/>
               </a:rPr>
-              <a:t>Conclusion</a:t>
-            </a:r>
-          </a:p>
-        </p:txBody>
-      </p:sp>
-      <p:sp>
-        <p:nvSpPr>
-          <p:cNvPr id="3" name="Rectangle 2"/>
-          <p:cNvSpPr/>
-          <p:nvPr/>
-        </p:nvSpPr>
-        <p:spPr>
-          <a:xfrm>
-            <a:off x="437084" y="1772816"/>
-            <a:ext cx="8136904" cy="3693319"/>
-          </a:xfrm>
-          <a:prstGeom prst="rect">
-            <a:avLst/>
-          </a:prstGeom>
-        </p:spPr>
-        <p:txBody>
-          <a:bodyPr wrap="square">
-            <a:spAutoFit/>
-          </a:bodyPr>
-          <a:lstStyle/>
-          <a:p>
-            <a:r>
-              <a:rPr lang="en-US" dirty="0">
-                <a:latin typeface="Times New Roman" pitchFamily="18" charset="0"/>
-                <a:cs typeface="Times New Roman" pitchFamily="18" charset="0"/>
-              </a:rPr>
-              <a:t>In conclusion, the Tribute Page project provides an opportunity to honor and celebrate the life and achievements of a person who has made a significant impact in their field or community. By building a well-designed and engaging tribute page, we can create a lasting and memorable tribute that inspires and educates others.</a:t>
-            </a:r>
-          </a:p>
-          <a:p>
-            <a:endParaRPr lang="en-US" dirty="0">
-              <a:latin typeface="Times New Roman" pitchFamily="18" charset="0"/>
-              <a:cs typeface="Times New Roman" pitchFamily="18" charset="0"/>
-            </a:endParaRPr>
-          </a:p>
-          <a:p>
-            <a:r>
-              <a:rPr lang="en-US" dirty="0">
-                <a:latin typeface="Times New Roman" pitchFamily="18" charset="0"/>
-                <a:cs typeface="Times New Roman" pitchFamily="18" charset="0"/>
-              </a:rPr>
-              <a:t>Throughout the project, we can utilize a range of web development tools and techniques to create a tribute page that is visually appealing, interactive, and informative.</a:t>
-            </a:r>
-          </a:p>
-          <a:p>
-            <a:endParaRPr lang="en-US" dirty="0">
-              <a:latin typeface="Times New Roman" pitchFamily="18" charset="0"/>
-              <a:cs typeface="Times New Roman" pitchFamily="18" charset="0"/>
-            </a:endParaRPr>
-          </a:p>
-          <a:p>
-            <a:r>
-              <a:rPr lang="en-US" dirty="0">
-                <a:latin typeface="Times New Roman" pitchFamily="18" charset="0"/>
-                <a:cs typeface="Times New Roman" pitchFamily="18" charset="0"/>
-              </a:rPr>
-              <a:t>Ultimately, the Tribute Page project is a chance to showcase our web development skills and creativity while paying tribute to a deserving individual. It can be a rewarding and meaningful project that provides an opportunity to learn new skills, showcase our work, and create something that has a positive impact on others.</a:t>
+              <a:t>References/Links used</a:t>
             </a:r>
           </a:p>
         </p:txBody>
@@ -4441,7 +4135,7 @@
           <p:cNvPr id="4" name="TextBox 3">
             <a:extLst>
               <a:ext uri="{FF2B5EF4-FFF2-40B4-BE49-F238E27FC236}">
-                <a16:creationId xmlns:a16="http://schemas.microsoft.com/office/drawing/2014/main" id="{56B8F8B6-BD7F-43F6-A733-0AC65DE75B2D}"/>
+                <a16:creationId xmlns:a16="http://schemas.microsoft.com/office/drawing/2014/main" id="{0A61EA2A-9C16-4F6F-8B7B-17B585ABF9F2}"/>
               </a:ext>
             </a:extLst>
           </p:cNvPr>
@@ -4469,7 +4163,7 @@
                 <a:latin typeface="Times New Roman" panose="02020603050405020304" pitchFamily="18" charset="0"/>
                 <a:cs typeface="Times New Roman" panose="02020603050405020304" pitchFamily="18" charset="0"/>
               </a:rPr>
-              <a:t>(6)</a:t>
+              <a:t>(7)</a:t>
             </a:r>
             <a:endParaRPr lang="en-IN" sz="1100" dirty="0">
               <a:latin typeface="Times New Roman" panose="02020603050405020304" pitchFamily="18" charset="0"/>
@@ -4478,12 +4172,152 @@
           </a:p>
         </p:txBody>
       </p:sp>
+      <p:sp>
+        <p:nvSpPr>
+          <p:cNvPr id="5" name="TextBox 4">
+            <a:extLst>
+              <a:ext uri="{FF2B5EF4-FFF2-40B4-BE49-F238E27FC236}">
+                <a16:creationId xmlns:a16="http://schemas.microsoft.com/office/drawing/2014/main" id="{9CB7CBEC-BF4D-4E21-8982-C2E25AEE9BA8}"/>
+              </a:ext>
+            </a:extLst>
+          </p:cNvPr>
+          <p:cNvSpPr txBox="1"/>
+          <p:nvPr/>
+        </p:nvSpPr>
+        <p:spPr>
+          <a:xfrm>
+            <a:off x="397372" y="2086353"/>
+            <a:ext cx="7845300" cy="4247317"/>
+          </a:xfrm>
+          <a:prstGeom prst="rect">
+            <a:avLst/>
+          </a:prstGeom>
+          <a:noFill/>
+        </p:spPr>
+        <p:txBody>
+          <a:bodyPr wrap="square" rtlCol="0">
+            <a:spAutoFit/>
+          </a:bodyPr>
+          <a:lstStyle/>
+          <a:p>
+            <a:pPr marL="342900" indent="-342900">
+              <a:buFont typeface="Arial" panose="020B0604020202020204" pitchFamily="34" charset="0"/>
+              <a:buChar char="•"/>
+            </a:pPr>
+            <a:r>
+              <a:rPr lang="en-IN" dirty="0">
+                <a:hlinkClick r:id="rId2"/>
+              </a:rPr>
+              <a:t>https://en.wikipedia.org/wiki/List_of_awards_and_honours_received_by_A._P._J._Abdul_Kalam</a:t>
+            </a:r>
+            <a:endParaRPr lang="en-IN" dirty="0"/>
+          </a:p>
+          <a:p>
+            <a:pPr marL="342900" indent="-342900">
+              <a:buFont typeface="Arial" panose="020B0604020202020204" pitchFamily="34" charset="0"/>
+              <a:buChar char="•"/>
+            </a:pPr>
+            <a:endParaRPr lang="en-IN" dirty="0"/>
+          </a:p>
+          <a:p>
+            <a:pPr marL="342900" indent="-342900">
+              <a:buFont typeface="Arial" panose="020B0604020202020204" pitchFamily="34" charset="0"/>
+              <a:buChar char="•"/>
+            </a:pPr>
+            <a:r>
+              <a:rPr lang="en-IN" dirty="0">
+                <a:hlinkClick r:id="rId3"/>
+              </a:rPr>
+              <a:t>https://en.wikipedia.org/wiki/A._P._J._Abdul_Kalam</a:t>
+            </a:r>
+            <a:endParaRPr lang="en-IN" dirty="0"/>
+          </a:p>
+          <a:p>
+            <a:pPr marL="342900" indent="-342900">
+              <a:buFont typeface="Arial" panose="020B0604020202020204" pitchFamily="34" charset="0"/>
+              <a:buChar char="•"/>
+            </a:pPr>
+            <a:endParaRPr lang="en-IN" dirty="0"/>
+          </a:p>
+          <a:p>
+            <a:pPr marL="342900" indent="-342900">
+              <a:buFont typeface="Arial" panose="020B0604020202020204" pitchFamily="34" charset="0"/>
+              <a:buChar char="•"/>
+            </a:pPr>
+            <a:r>
+              <a:rPr lang="en-IN" dirty="0">
+                <a:hlinkClick r:id="rId4"/>
+              </a:rPr>
+              <a:t>https://learn.culturalindia.net/a-p-j-abdul-kalam.html</a:t>
+            </a:r>
+            <a:endParaRPr lang="en-IN" dirty="0"/>
+          </a:p>
+          <a:p>
+            <a:pPr marL="342900" indent="-342900">
+              <a:buFont typeface="Arial" panose="020B0604020202020204" pitchFamily="34" charset="0"/>
+              <a:buChar char="•"/>
+            </a:pPr>
+            <a:endParaRPr lang="en-IN" dirty="0"/>
+          </a:p>
+          <a:p>
+            <a:pPr marL="342900" indent="-342900">
+              <a:buFont typeface="Arial" panose="020B0604020202020204" pitchFamily="34" charset="0"/>
+              <a:buChar char="•"/>
+            </a:pPr>
+            <a:r>
+              <a:rPr lang="en-IN" dirty="0">
+                <a:hlinkClick r:id="rId5"/>
+              </a:rPr>
+              <a:t>https://www.britannica.com/biography/A-P-J-Abdul-Kalam</a:t>
+            </a:r>
+            <a:endParaRPr lang="en-IN" dirty="0"/>
+          </a:p>
+          <a:p>
+            <a:pPr marL="342900" indent="-342900">
+              <a:buFont typeface="Arial" panose="020B0604020202020204" pitchFamily="34" charset="0"/>
+              <a:buChar char="•"/>
+            </a:pPr>
+            <a:endParaRPr lang="en-IN" dirty="0"/>
+          </a:p>
+          <a:p>
+            <a:pPr marL="342900" indent="-342900">
+              <a:buFont typeface="Arial" panose="020B0604020202020204" pitchFamily="34" charset="0"/>
+              <a:buChar char="•"/>
+            </a:pPr>
+            <a:r>
+              <a:rPr lang="en-IN" dirty="0">
+                <a:hlinkClick r:id="rId6"/>
+              </a:rPr>
+              <a:t>https://www.thefamouspeople.com/profiles/a-p-j-abdul-kalam-590.php</a:t>
+            </a:r>
+            <a:endParaRPr lang="en-IN" dirty="0"/>
+          </a:p>
+          <a:p>
+            <a:endParaRPr lang="en-IN" dirty="0"/>
+          </a:p>
+          <a:p>
+            <a:endParaRPr lang="en-IN" dirty="0"/>
+          </a:p>
+          <a:p>
+            <a:endParaRPr lang="en-IN" dirty="0"/>
+          </a:p>
+          <a:p>
+            <a:pPr marL="342900" indent="-342900">
+              <a:buFont typeface="Arial" panose="020B0604020202020204" pitchFamily="34" charset="0"/>
+              <a:buChar char="•"/>
+            </a:pPr>
+            <a:endParaRPr lang="en-IN" dirty="0"/>
+          </a:p>
+          <a:p>
+            <a:pPr marL="342900" indent="-342900">
+              <a:buFont typeface="Arial" panose="020B0604020202020204" pitchFamily="34" charset="0"/>
+              <a:buChar char="•"/>
+            </a:pPr>
+            <a:endParaRPr lang="en-IN" dirty="0"/>
+          </a:p>
+        </p:txBody>
+      </p:sp>
     </p:spTree>
-    <p:extLst>
-      <p:ext uri="{BB962C8B-B14F-4D97-AF65-F5344CB8AC3E}">
-        <p14:creationId xmlns:p14="http://schemas.microsoft.com/office/powerpoint/2010/main" val="3569010666"/>
-      </p:ext>
-    </p:extLst>
   </p:cSld>
   <p:clrMapOvr>
     <a:masterClrMapping/>

</xml_diff>